<commit_message>
kleine menu fix dinges
</commit_message>
<xml_diff>
--- a/presentatie_oplevering.pptx
+++ b/presentatie_oplevering.pptx
@@ -866,7 +866,7 @@
             <a:fld id="{B61BEF0D-F0BB-DE4B-95CE-6DB70DBA9567}" type="datetimeFigureOut">
               <a:rPr lang="en-US" dirty="0"/>
               <a:pPr/>
-              <a:t>1/25/2015</a:t>
+              <a:t>1/26/2015</a:t>
             </a:fld>
             <a:endParaRPr lang="en-US" dirty="0"/>
           </a:p>
@@ -1114,7 +1114,7 @@
             <a:fld id="{B61BEF0D-F0BB-DE4B-95CE-6DB70DBA9567}" type="datetimeFigureOut">
               <a:rPr lang="en-US" dirty="0"/>
               <a:pPr/>
-              <a:t>1/25/2015</a:t>
+              <a:t>1/26/2015</a:t>
             </a:fld>
             <a:endParaRPr lang="en-US" dirty="0"/>
           </a:p>
@@ -1425,7 +1425,7 @@
             <a:fld id="{B61BEF0D-F0BB-DE4B-95CE-6DB70DBA9567}" type="datetimeFigureOut">
               <a:rPr lang="en-US" dirty="0"/>
               <a:pPr/>
-              <a:t>1/25/2015</a:t>
+              <a:t>1/26/2015</a:t>
             </a:fld>
             <a:endParaRPr lang="en-US" dirty="0"/>
           </a:p>
@@ -1763,7 +1763,7 @@
             <a:fld id="{B61BEF0D-F0BB-DE4B-95CE-6DB70DBA9567}" type="datetimeFigureOut">
               <a:rPr lang="en-US" dirty="0"/>
               <a:pPr/>
-              <a:t>1/25/2015</a:t>
+              <a:t>1/26/2015</a:t>
             </a:fld>
             <a:endParaRPr lang="en-US" dirty="0"/>
           </a:p>
@@ -2074,7 +2074,7 @@
             <a:fld id="{B61BEF0D-F0BB-DE4B-95CE-6DB70DBA9567}" type="datetimeFigureOut">
               <a:rPr lang="en-US" dirty="0"/>
               <a:pPr/>
-              <a:t>1/25/2015</a:t>
+              <a:t>1/26/2015</a:t>
             </a:fld>
             <a:endParaRPr lang="en-US" dirty="0"/>
           </a:p>
@@ -2464,7 +2464,7 @@
             <a:fld id="{B61BEF0D-F0BB-DE4B-95CE-6DB70DBA9567}" type="datetimeFigureOut">
               <a:rPr lang="en-US" dirty="0"/>
               <a:pPr/>
-              <a:t>1/25/2015</a:t>
+              <a:t>1/26/2015</a:t>
             </a:fld>
             <a:endParaRPr lang="en-US" dirty="0"/>
           </a:p>
@@ -2630,7 +2630,7 @@
           <a:p>
             <a:fld id="{55C6B4A9-1611-4792-9094-5F34BCA07E0B}" type="datetimeFigureOut">
               <a:rPr lang="en-US" dirty="0"/>
-              <a:t>1/25/2015</a:t>
+              <a:t>1/26/2015</a:t>
             </a:fld>
             <a:endParaRPr lang="en-US" dirty="0"/>
           </a:p>
@@ -2806,7 +2806,7 @@
             <a:fld id="{B61BEF0D-F0BB-DE4B-95CE-6DB70DBA9567}" type="datetimeFigureOut">
               <a:rPr lang="en-US" dirty="0"/>
               <a:pPr/>
-              <a:t>1/25/2015</a:t>
+              <a:t>1/26/2015</a:t>
             </a:fld>
             <a:endParaRPr lang="en-US" dirty="0"/>
           </a:p>
@@ -2979,7 +2979,7 @@
             <a:fld id="{B61BEF0D-F0BB-DE4B-95CE-6DB70DBA9567}" type="datetimeFigureOut">
               <a:rPr lang="en-US" dirty="0"/>
               <a:pPr/>
-              <a:t>1/25/2015</a:t>
+              <a:t>1/26/2015</a:t>
             </a:fld>
             <a:endParaRPr lang="en-US" dirty="0"/>
           </a:p>
@@ -3223,7 +3223,7 @@
             <a:fld id="{B61BEF0D-F0BB-DE4B-95CE-6DB70DBA9567}" type="datetimeFigureOut">
               <a:rPr lang="en-US" dirty="0"/>
               <a:pPr/>
-              <a:t>1/25/2015</a:t>
+              <a:t>1/26/2015</a:t>
             </a:fld>
             <a:endParaRPr lang="en-US" dirty="0"/>
           </a:p>
@@ -3451,7 +3451,7 @@
           <a:p>
             <a:fld id="{EB712588-04B1-427B-82EE-E8DB90309F08}" type="datetimeFigureOut">
               <a:rPr lang="en-US" dirty="0"/>
-              <a:t>1/25/2015</a:t>
+              <a:t>1/26/2015</a:t>
             </a:fld>
             <a:endParaRPr lang="en-US" dirty="0"/>
           </a:p>
@@ -3821,7 +3821,7 @@
             <a:fld id="{B61BEF0D-F0BB-DE4B-95CE-6DB70DBA9567}" type="datetimeFigureOut">
               <a:rPr lang="en-US" dirty="0"/>
               <a:pPr/>
-              <a:t>1/25/2015</a:t>
+              <a:t>1/26/2015</a:t>
             </a:fld>
             <a:endParaRPr lang="en-US" dirty="0"/>
           </a:p>
@@ -3941,7 +3941,7 @@
             <a:fld id="{B61BEF0D-F0BB-DE4B-95CE-6DB70DBA9567}" type="datetimeFigureOut">
               <a:rPr lang="en-US" dirty="0"/>
               <a:pPr/>
-              <a:t>1/25/2015</a:t>
+              <a:t>1/26/2015</a:t>
             </a:fld>
             <a:endParaRPr lang="en-US" dirty="0"/>
           </a:p>
@@ -4033,7 +4033,7 @@
             <a:fld id="{B61BEF0D-F0BB-DE4B-95CE-6DB70DBA9567}" type="datetimeFigureOut">
               <a:rPr lang="en-US" dirty="0"/>
               <a:pPr/>
-              <a:t>1/25/2015</a:t>
+              <a:t>1/26/2015</a:t>
             </a:fld>
             <a:endParaRPr lang="en-US" dirty="0"/>
           </a:p>
@@ -4284,7 +4284,7 @@
           <a:p>
             <a:fld id="{42A54C80-263E-416B-A8E0-580EDEADCBDC}" type="datetimeFigureOut">
               <a:rPr lang="en-US" dirty="0"/>
-              <a:t>1/25/2015</a:t>
+              <a:t>1/26/2015</a:t>
             </a:fld>
             <a:endParaRPr lang="en-US" dirty="0"/>
           </a:p>
@@ -4543,7 +4543,7 @@
             <a:fld id="{B61BEF0D-F0BB-DE4B-95CE-6DB70DBA9567}" type="datetimeFigureOut">
               <a:rPr lang="en-US" dirty="0"/>
               <a:pPr/>
-              <a:t>1/25/2015</a:t>
+              <a:t>1/26/2015</a:t>
             </a:fld>
             <a:endParaRPr lang="en-US" dirty="0"/>
           </a:p>
@@ -5283,7 +5283,7 @@
             <a:fld id="{B61BEF0D-F0BB-DE4B-95CE-6DB70DBA9567}" type="datetimeFigureOut">
               <a:rPr lang="en-US" dirty="0"/>
               <a:pPr/>
-              <a:t>1/25/2015</a:t>
+              <a:t>1/26/2015</a:t>
             </a:fld>
             <a:endParaRPr lang="en-US" dirty="0"/>
           </a:p>
@@ -6717,21 +6717,115 @@
           <a:lstStyle/>
           <a:p>
             <a:r>
-              <a:rPr lang="nl-NL" dirty="0" smtClean="0"/>
-              <a:t>Opdracht 1</a:t>
-            </a:r>
-          </a:p>
-          <a:p>
-            <a:r>
-              <a:rPr lang="nl-NL" dirty="0" smtClean="0"/>
-              <a:t>Opdracht 2</a:t>
-            </a:r>
-          </a:p>
-          <a:p>
-            <a:r>
-              <a:rPr lang="nl-NL" dirty="0" smtClean="0"/>
-              <a:t>Opdracht 3</a:t>
-            </a:r>
+              <a:rPr lang="en-US" dirty="0" smtClean="0"/>
+              <a:t>Merchandise data </a:t>
+            </a:r>
+            <a:r>
+              <a:rPr lang="en-US" dirty="0" err="1" smtClean="0"/>
+              <a:t>uit</a:t>
+            </a:r>
+            <a:r>
+              <a:rPr lang="en-US" dirty="0" smtClean="0"/>
+              <a:t> database laden</a:t>
+            </a:r>
+            <a:endParaRPr lang="nl-NL" dirty="0" smtClean="0"/>
+          </a:p>
+          <a:p>
+            <a:r>
+              <a:rPr lang="en-US" dirty="0" err="1" smtClean="0"/>
+              <a:t>Muziek</a:t>
+            </a:r>
+            <a:r>
+              <a:rPr lang="en-US" dirty="0" smtClean="0"/>
+              <a:t> </a:t>
+            </a:r>
+            <a:r>
+              <a:rPr lang="en-US" dirty="0" err="1" smtClean="0"/>
+              <a:t>pagina</a:t>
+            </a:r>
+            <a:r>
+              <a:rPr lang="en-US" dirty="0" smtClean="0"/>
+              <a:t> data </a:t>
+            </a:r>
+            <a:r>
+              <a:rPr lang="en-US" dirty="0" err="1" smtClean="0"/>
+              <a:t>uit</a:t>
+            </a:r>
+            <a:r>
+              <a:rPr lang="en-US" dirty="0" smtClean="0"/>
+              <a:t> database laden</a:t>
+            </a:r>
+            <a:endParaRPr lang="nl-NL" dirty="0" smtClean="0"/>
+          </a:p>
+          <a:p>
+            <a:r>
+              <a:rPr lang="en-US" dirty="0" smtClean="0"/>
+              <a:t>Code </a:t>
+            </a:r>
+            <a:r>
+              <a:rPr lang="en-US" dirty="0" err="1" smtClean="0"/>
+              <a:t>geoptimaliseerd</a:t>
+            </a:r>
+            <a:endParaRPr lang="en-US" dirty="0" smtClean="0"/>
+          </a:p>
+          <a:p>
+            <a:r>
+              <a:rPr lang="en-US" dirty="0" smtClean="0"/>
+              <a:t>Add product </a:t>
+            </a:r>
+            <a:r>
+              <a:rPr lang="en-US" dirty="0" err="1" smtClean="0"/>
+              <a:t>pagina</a:t>
+            </a:r>
+            <a:r>
+              <a:rPr lang="en-US" dirty="0" smtClean="0"/>
+              <a:t> </a:t>
+            </a:r>
+            <a:r>
+              <a:rPr lang="en-US" dirty="0" err="1" smtClean="0"/>
+              <a:t>gefixed</a:t>
+            </a:r>
+            <a:r>
+              <a:rPr lang="en-US" dirty="0" smtClean="0"/>
+              <a:t> (</a:t>
+            </a:r>
+            <a:r>
+              <a:rPr lang="en-US" dirty="0" err="1" smtClean="0"/>
+              <a:t>werkte</a:t>
+            </a:r>
+            <a:r>
+              <a:rPr lang="en-US" dirty="0" smtClean="0"/>
+              <a:t> </a:t>
+            </a:r>
+            <a:r>
+              <a:rPr lang="en-US" dirty="0" err="1" smtClean="0"/>
+              <a:t>niet</a:t>
+            </a:r>
+            <a:r>
+              <a:rPr lang="en-US" dirty="0" smtClean="0"/>
+              <a:t> </a:t>
+            </a:r>
+            <a:r>
+              <a:rPr lang="en-US" dirty="0" err="1" smtClean="0"/>
+              <a:t>goed</a:t>
+            </a:r>
+            <a:r>
+              <a:rPr lang="en-US" dirty="0" smtClean="0"/>
+              <a:t> </a:t>
+            </a:r>
+            <a:r>
+              <a:rPr lang="en-US" dirty="0" err="1" smtClean="0"/>
+              <a:t>meer</a:t>
+            </a:r>
+            <a:r>
+              <a:rPr lang="en-US" dirty="0" smtClean="0"/>
+              <a:t> </a:t>
+            </a:r>
+            <a:r>
+              <a:rPr lang="en-US" smtClean="0"/>
+              <a:t>in admin panel)</a:t>
+            </a:r>
+            <a:endParaRPr lang="nl-NL" dirty="0" smtClean="0"/>
           </a:p>
         </p:txBody>
       </p:sp>
@@ -7186,7 +7280,7 @@
   <a:extraClrSchemeLst/>
   <a:extLst>
     <a:ext uri="{05A4C25C-085E-4340-85A3-A5531E510DB2}">
-      <thm15:themeFamily xmlns="" xmlns:thm15="http://schemas.microsoft.com/office/thememl/2012/main" name="Facet" id="{C0C680CD-088A-49FC-A102-D699147F32B2}" vid="{CFBC31BA-B70F-4F30-BCAA-4F3011E16C4D}"/>
+      <thm15:themeFamily xmlns:thm15="http://schemas.microsoft.com/office/thememl/2012/main" xmlns="" name="Facet" id="{C0C680CD-088A-49FC-A102-D699147F32B2}" vid="{CFBC31BA-B70F-4F30-BCAA-4F3011E16C4D}"/>
     </a:ext>
   </a:extLst>
 </a:theme>

</xml_diff>